<commit_message>
020519 0845  Presentation update
</commit_message>
<xml_diff>
--- a/Presentation/TrafficMon Presentation.pptx
+++ b/Presentation/TrafficMon Presentation.pptx
@@ -13247,7 +13247,7 @@
           <a:effectLst/>
           <a:extLst>
             <a:ext uri="{91240B29-F687-4f45-9708-019B960494DF}">
-              <a14:hiddenLine xmlns="" xmlns:a14="http://schemas.microsoft.com/office/drawing/2010/main" w="9525">
+              <a14:hiddenLine xmlns:a14="http://schemas.microsoft.com/office/drawing/2010/main" xmlns="" w="9525">
                 <a:solidFill>
                   <a:srgbClr val="000000"/>
                 </a:solidFill>
@@ -14775,7 +14775,7 @@
           <a:ln/>
           <a:extLst>
             <a:ext uri="{91240B29-F687-4f45-9708-019B960494DF}">
-              <a14:hiddenLine xmlns="" xmlns:a14="http://schemas.microsoft.com/office/drawing/2010/main" w="9525">
+              <a14:hiddenLine xmlns:a14="http://schemas.microsoft.com/office/drawing/2010/main" xmlns="" w="9525">
                 <a:solidFill>
                   <a:srgbClr val="000000"/>
                 </a:solidFill>
@@ -15050,7 +15050,7 @@
           <a:ln/>
           <a:extLst>
             <a:ext uri="{91240B29-F687-4f45-9708-019B960494DF}">
-              <a14:hiddenLine xmlns="" xmlns:a14="http://schemas.microsoft.com/office/drawing/2010/main" w="9525">
+              <a14:hiddenLine xmlns:a14="http://schemas.microsoft.com/office/drawing/2010/main" xmlns="" w="9525">
                 <a:solidFill>
                   <a:srgbClr val="000000"/>
                 </a:solidFill>
@@ -15333,7 +15333,7 @@
           <a:ln/>
           <a:extLst>
             <a:ext uri="{91240B29-F687-4f45-9708-019B960494DF}">
-              <a14:hiddenLine xmlns="" xmlns:a14="http://schemas.microsoft.com/office/drawing/2010/main" w="9525">
+              <a14:hiddenLine xmlns:a14="http://schemas.microsoft.com/office/drawing/2010/main" xmlns="" w="9525">
                 <a:solidFill>
                   <a:srgbClr val="000000"/>
                 </a:solidFill>
@@ -15959,7 +15959,7 @@
           <a:ln/>
           <a:extLst>
             <a:ext uri="{91240B29-F687-4f45-9708-019B960494DF}">
-              <a14:hiddenLine xmlns="" xmlns:a14="http://schemas.microsoft.com/office/drawing/2010/main" w="9525">
+              <a14:hiddenLine xmlns:a14="http://schemas.microsoft.com/office/drawing/2010/main" xmlns="" w="9525">
                 <a:solidFill>
                   <a:srgbClr val="000000"/>
                 </a:solidFill>
@@ -16298,7 +16298,7 @@
           <a:ln/>
           <a:extLst>
             <a:ext uri="{91240B29-F687-4f45-9708-019B960494DF}">
-              <a14:hiddenLine xmlns="" xmlns:a14="http://schemas.microsoft.com/office/drawing/2010/main" w="9525">
+              <a14:hiddenLine xmlns:a14="http://schemas.microsoft.com/office/drawing/2010/main" xmlns="" w="9525">
                 <a:solidFill>
                   <a:srgbClr val="000000"/>
                 </a:solidFill>
@@ -16775,7 +16775,7 @@
           <a:ln/>
           <a:extLst>
             <a:ext uri="{91240B29-F687-4f45-9708-019B960494DF}">
-              <a14:hiddenLine xmlns="" xmlns:a14="http://schemas.microsoft.com/office/drawing/2010/main" w="9525">
+              <a14:hiddenLine xmlns:a14="http://schemas.microsoft.com/office/drawing/2010/main" xmlns="" w="9525">
                 <a:solidFill>
                   <a:srgbClr val="000000"/>
                 </a:solidFill>
@@ -17204,7 +17204,7 @@
           <a:ln/>
           <a:extLst>
             <a:ext uri="{91240B29-F687-4f45-9708-019B960494DF}">
-              <a14:hiddenLine xmlns="" xmlns:a14="http://schemas.microsoft.com/office/drawing/2010/main" w="9525">
+              <a14:hiddenLine xmlns:a14="http://schemas.microsoft.com/office/drawing/2010/main" xmlns="" w="9525">
                 <a:solidFill>
                   <a:srgbClr val="000000"/>
                 </a:solidFill>
@@ -18893,7 +18893,7 @@
           <a:effectLst/>
           <a:extLst>
             <a:ext uri="{91240B29-F687-4f45-9708-019B960494DF}">
-              <a14:hiddenLine xmlns:a16="http://schemas.microsoft.com/office/drawing/2014/main" xmlns:p14="http://schemas.microsoft.com/office/powerpoint/2010/main" xmlns:a14="http://schemas.microsoft.com/office/drawing/2010/main" xmlns="" w="9525">
+              <a14:hiddenLine xmlns="" xmlns:a14="http://schemas.microsoft.com/office/drawing/2010/main" xmlns:p14="http://schemas.microsoft.com/office/powerpoint/2010/main" xmlns:a16="http://schemas.microsoft.com/office/drawing/2014/main" w="9525">
                 <a:solidFill>
                   <a:srgbClr val="000000"/>
                 </a:solidFill>

</xml_diff>

<commit_message>
020619 0830 Readme and Presentation update
</commit_message>
<xml_diff>
--- a/Presentation/TrafficMon Presentation.pptx
+++ b/Presentation/TrafficMon Presentation.pptx
@@ -12885,7 +12885,7 @@
           <a:p>
             <a:fld id="{E7E643A0-4DBD-CB4C-9DC5-E04D76B82312}" type="datetimeFigureOut">
               <a:rPr lang="en-US" smtClean="0"/>
-              <a:t>2/5/19</a:t>
+              <a:t>2/6/19</a:t>
             </a:fld>
             <a:endParaRPr lang="en-US"/>
           </a:p>
@@ -13247,7 +13247,7 @@
           <a:effectLst/>
           <a:extLst>
             <a:ext uri="{91240B29-F687-4f45-9708-019B960494DF}">
-              <a14:hiddenLine xmlns:a14="http://schemas.microsoft.com/office/drawing/2010/main" xmlns="" w="9525">
+              <a14:hiddenLine xmlns="" xmlns:a14="http://schemas.microsoft.com/office/drawing/2010/main" w="9525">
                 <a:solidFill>
                   <a:srgbClr val="000000"/>
                 </a:solidFill>
@@ -13439,7 +13439,7 @@
           <a:p>
             <a:fld id="{48A87A34-81AB-432B-8DAE-1953F412C126}" type="datetimeFigureOut">
               <a:rPr lang="en-US" smtClean="0"/>
-              <a:t>2/5/19</a:t>
+              <a:t>2/6/19</a:t>
             </a:fld>
             <a:endParaRPr lang="en-US" dirty="0"/>
           </a:p>
@@ -13758,7 +13758,7 @@
             <a:fld id="{48A87A34-81AB-432B-8DAE-1953F412C126}" type="datetimeFigureOut">
               <a:rPr lang="en-US" smtClean="0"/>
               <a:pPr/>
-              <a:t>2/5/19</a:t>
+              <a:t>2/6/19</a:t>
             </a:fld>
             <a:endParaRPr lang="en-US" dirty="0"/>
           </a:p>
@@ -14248,7 +14248,7 @@
             <a:fld id="{48A87A34-81AB-432B-8DAE-1953F412C126}" type="datetimeFigureOut">
               <a:rPr lang="en-US" smtClean="0"/>
               <a:pPr/>
-              <a:t>2/5/19</a:t>
+              <a:t>2/6/19</a:t>
             </a:fld>
             <a:endParaRPr lang="en-US" dirty="0"/>
           </a:p>
@@ -14619,7 +14619,7 @@
             <a:fld id="{48A87A34-81AB-432B-8DAE-1953F412C126}" type="datetimeFigureOut">
               <a:rPr lang="en-US" smtClean="0"/>
               <a:pPr/>
-              <a:t>2/5/19</a:t>
+              <a:t>2/6/19</a:t>
             </a:fld>
             <a:endParaRPr lang="en-US" dirty="0"/>
           </a:p>
@@ -14775,7 +14775,7 @@
           <a:ln/>
           <a:extLst>
             <a:ext uri="{91240B29-F687-4f45-9708-019B960494DF}">
-              <a14:hiddenLine xmlns:a14="http://schemas.microsoft.com/office/drawing/2010/main" xmlns="" w="9525">
+              <a14:hiddenLine xmlns="" xmlns:a14="http://schemas.microsoft.com/office/drawing/2010/main" w="9525">
                 <a:solidFill>
                   <a:srgbClr val="000000"/>
                 </a:solidFill>
@@ -14893,7 +14893,7 @@
           <a:p>
             <a:fld id="{48A87A34-81AB-432B-8DAE-1953F412C126}" type="datetimeFigureOut">
               <a:rPr lang="en-US" smtClean="0"/>
-              <a:t>2/5/19</a:t>
+              <a:t>2/6/19</a:t>
             </a:fld>
             <a:endParaRPr lang="en-US" dirty="0"/>
           </a:p>
@@ -15050,7 +15050,7 @@
           <a:ln/>
           <a:extLst>
             <a:ext uri="{91240B29-F687-4f45-9708-019B960494DF}">
-              <a14:hiddenLine xmlns:a14="http://schemas.microsoft.com/office/drawing/2010/main" xmlns="" w="9525">
+              <a14:hiddenLine xmlns="" xmlns:a14="http://schemas.microsoft.com/office/drawing/2010/main" w="9525">
                 <a:solidFill>
                   <a:srgbClr val="000000"/>
                 </a:solidFill>
@@ -15178,7 +15178,7 @@
           <a:p>
             <a:fld id="{48A87A34-81AB-432B-8DAE-1953F412C126}" type="datetimeFigureOut">
               <a:rPr lang="en-US" smtClean="0"/>
-              <a:t>2/5/19</a:t>
+              <a:t>2/6/19</a:t>
             </a:fld>
             <a:endParaRPr lang="en-US" dirty="0"/>
           </a:p>
@@ -15333,7 +15333,7 @@
           <a:ln/>
           <a:extLst>
             <a:ext uri="{91240B29-F687-4f45-9708-019B960494DF}">
-              <a14:hiddenLine xmlns:a14="http://schemas.microsoft.com/office/drawing/2010/main" xmlns="" w="9525">
+              <a14:hiddenLine xmlns="" xmlns:a14="http://schemas.microsoft.com/office/drawing/2010/main" w="9525">
                 <a:solidFill>
                   <a:srgbClr val="000000"/>
                 </a:solidFill>
@@ -15461,7 +15461,7 @@
           <a:p>
             <a:fld id="{48A87A34-81AB-432B-8DAE-1953F412C126}" type="datetimeFigureOut">
               <a:rPr lang="en-US" smtClean="0"/>
-              <a:t>2/5/19</a:t>
+              <a:t>2/6/19</a:t>
             </a:fld>
             <a:endParaRPr lang="en-US" dirty="0"/>
           </a:p>
@@ -15804,7 +15804,7 @@
           <a:p>
             <a:fld id="{48A87A34-81AB-432B-8DAE-1953F412C126}" type="datetimeFigureOut">
               <a:rPr lang="en-US" smtClean="0"/>
-              <a:t>2/5/19</a:t>
+              <a:t>2/6/19</a:t>
             </a:fld>
             <a:endParaRPr lang="en-US" dirty="0"/>
           </a:p>
@@ -15959,7 +15959,7 @@
           <a:ln/>
           <a:extLst>
             <a:ext uri="{91240B29-F687-4f45-9708-019B960494DF}">
-              <a14:hiddenLine xmlns:a14="http://schemas.microsoft.com/office/drawing/2010/main" xmlns="" w="9525">
+              <a14:hiddenLine xmlns="" xmlns:a14="http://schemas.microsoft.com/office/drawing/2010/main" w="9525">
                 <a:solidFill>
                   <a:srgbClr val="000000"/>
                 </a:solidFill>
@@ -16143,7 +16143,7 @@
           <a:p>
             <a:fld id="{48A87A34-81AB-432B-8DAE-1953F412C126}" type="datetimeFigureOut">
               <a:rPr lang="en-US" smtClean="0"/>
-              <a:t>2/5/19</a:t>
+              <a:t>2/6/19</a:t>
             </a:fld>
             <a:endParaRPr lang="en-US" dirty="0"/>
           </a:p>
@@ -16298,7 +16298,7 @@
           <a:ln/>
           <a:extLst>
             <a:ext uri="{91240B29-F687-4f45-9708-019B960494DF}">
-              <a14:hiddenLine xmlns:a14="http://schemas.microsoft.com/office/drawing/2010/main" xmlns="" w="9525">
+              <a14:hiddenLine xmlns="" xmlns:a14="http://schemas.microsoft.com/office/drawing/2010/main" w="9525">
                 <a:solidFill>
                   <a:srgbClr val="000000"/>
                 </a:solidFill>
@@ -16620,7 +16620,7 @@
           <a:p>
             <a:fld id="{48A87A34-81AB-432B-8DAE-1953F412C126}" type="datetimeFigureOut">
               <a:rPr lang="en-US" smtClean="0"/>
-              <a:t>2/5/19</a:t>
+              <a:t>2/6/19</a:t>
             </a:fld>
             <a:endParaRPr lang="en-US" dirty="0"/>
           </a:p>
@@ -16775,7 +16775,7 @@
           <a:ln/>
           <a:extLst>
             <a:ext uri="{91240B29-F687-4f45-9708-019B960494DF}">
-              <a14:hiddenLine xmlns:a14="http://schemas.microsoft.com/office/drawing/2010/main" xmlns="" w="9525">
+              <a14:hiddenLine xmlns="" xmlns:a14="http://schemas.microsoft.com/office/drawing/2010/main" w="9525">
                 <a:solidFill>
                   <a:srgbClr val="000000"/>
                 </a:solidFill>
@@ -16841,7 +16841,7 @@
           <a:p>
             <a:fld id="{48A87A34-81AB-432B-8DAE-1953F412C126}" type="datetimeFigureOut">
               <a:rPr lang="en-US" smtClean="0"/>
-              <a:t>2/5/19</a:t>
+              <a:t>2/6/19</a:t>
             </a:fld>
             <a:endParaRPr lang="en-US" dirty="0"/>
           </a:p>
@@ -16936,7 +16936,7 @@
           <a:p>
             <a:fld id="{48A87A34-81AB-432B-8DAE-1953F412C126}" type="datetimeFigureOut">
               <a:rPr lang="en-US" smtClean="0"/>
-              <a:t>2/5/19</a:t>
+              <a:t>2/6/19</a:t>
             </a:fld>
             <a:endParaRPr lang="en-US" dirty="0"/>
           </a:p>
@@ -17204,7 +17204,7 @@
           <a:ln/>
           <a:extLst>
             <a:ext uri="{91240B29-F687-4f45-9708-019B960494DF}">
-              <a14:hiddenLine xmlns:a14="http://schemas.microsoft.com/office/drawing/2010/main" xmlns="" w="9525">
+              <a14:hiddenLine xmlns="" xmlns:a14="http://schemas.microsoft.com/office/drawing/2010/main" w="9525">
                 <a:solidFill>
                   <a:srgbClr val="000000"/>
                 </a:solidFill>
@@ -17403,7 +17403,7 @@
           <a:p>
             <a:fld id="{48A87A34-81AB-432B-8DAE-1953F412C126}" type="datetimeFigureOut">
               <a:rPr lang="en-US" smtClean="0"/>
-              <a:t>2/5/19</a:t>
+              <a:t>2/6/19</a:t>
             </a:fld>
             <a:endParaRPr lang="en-US" dirty="0"/>
           </a:p>
@@ -17717,7 +17717,7 @@
             <a:fld id="{48A87A34-81AB-432B-8DAE-1953F412C126}" type="datetimeFigureOut">
               <a:rPr lang="en-US" smtClean="0"/>
               <a:pPr/>
-              <a:t>2/5/19</a:t>
+              <a:t>2/6/19</a:t>
             </a:fld>
             <a:endParaRPr lang="en-US" dirty="0"/>
           </a:p>
@@ -17989,7 +17989,7 @@
             <a:fld id="{48A87A34-81AB-432B-8DAE-1953F412C126}" type="datetimeFigureOut">
               <a:rPr lang="en-US" smtClean="0"/>
               <a:pPr/>
-              <a:t>2/5/19</a:t>
+              <a:t>2/6/19</a:t>
             </a:fld>
             <a:endParaRPr lang="en-US" dirty="0"/>
           </a:p>
@@ -18893,7 +18893,7 @@
           <a:effectLst/>
           <a:extLst>
             <a:ext uri="{91240B29-F687-4f45-9708-019B960494DF}">
-              <a14:hiddenLine xmlns="" xmlns:a14="http://schemas.microsoft.com/office/drawing/2010/main" xmlns:p14="http://schemas.microsoft.com/office/powerpoint/2010/main" xmlns:a16="http://schemas.microsoft.com/office/drawing/2014/main" w="9525">
+              <a14:hiddenLine xmlns:a16="http://schemas.microsoft.com/office/drawing/2014/main" xmlns:p14="http://schemas.microsoft.com/office/powerpoint/2010/main" xmlns:a14="http://schemas.microsoft.com/office/drawing/2010/main" xmlns="" w="9525">
                 <a:solidFill>
                   <a:srgbClr val="000000"/>
                 </a:solidFill>

</xml_diff>

<commit_message>
020619 0900 Readme and Presentation update
</commit_message>
<xml_diff>
--- a/Presentation/TrafficMon Presentation.pptx
+++ b/Presentation/TrafficMon Presentation.pptx
@@ -3887,11 +3887,22 @@
         <a:lstStyle/>
         <a:p>
           <a:pPr>
+            <a:lnSpc>
+              <a:spcPct val="100000"/>
+            </a:lnSpc>
             <a:defRPr b="1"/>
           </a:pPr>
           <a:r>
             <a:rPr lang="en-US" dirty="0"/>
-            <a:t>The Traffic interface was created using Bootstrap and CSS</a:t>
+            <a:t>The </a:t>
+          </a:r>
+          <a:r>
+            <a:rPr lang="en-US" dirty="0" err="1"/>
+            <a:t>TrafficMon</a:t>
+          </a:r>
+          <a:r>
+            <a:rPr lang="en-US" dirty="0"/>
+            <a:t> interface was created using Bootstrap and CSS</a:t>
           </a:r>
         </a:p>
       </dgm:t>
@@ -3926,6 +3937,9 @@
         <a:lstStyle/>
         <a:p>
           <a:pPr>
+            <a:lnSpc>
+              <a:spcPct val="100000"/>
+            </a:lnSpc>
             <a:defRPr b="1"/>
           </a:pPr>
           <a:r>
@@ -3957,78 +3971,6 @@
         </a:p>
       </dgm:t>
     </dgm:pt>
-    <dgm:pt modelId="{B97FE348-2AB6-4978-852D-2F0D08C8CB18}">
-      <dgm:prSet/>
-      <dgm:spPr/>
-      <dgm:t>
-        <a:bodyPr/>
-        <a:lstStyle/>
-        <a:p>
-          <a:r>
-            <a:rPr lang="en-US" dirty="0"/>
-            <a:t>Forms</a:t>
-          </a:r>
-        </a:p>
-      </dgm:t>
-    </dgm:pt>
-    <dgm:pt modelId="{CB4143C1-7673-4E4A-9CAF-4288107FA632}" type="parTrans" cxnId="{C12A122C-58CF-42CF-9AB5-3BA410ADEE77}">
-      <dgm:prSet/>
-      <dgm:spPr/>
-      <dgm:t>
-        <a:bodyPr/>
-        <a:lstStyle/>
-        <a:p>
-          <a:endParaRPr lang="en-US"/>
-        </a:p>
-      </dgm:t>
-    </dgm:pt>
-    <dgm:pt modelId="{7E25D265-194D-4517-9852-59851AC39E82}" type="sibTrans" cxnId="{C12A122C-58CF-42CF-9AB5-3BA410ADEE77}">
-      <dgm:prSet/>
-      <dgm:spPr/>
-      <dgm:t>
-        <a:bodyPr/>
-        <a:lstStyle/>
-        <a:p>
-          <a:endParaRPr lang="en-US"/>
-        </a:p>
-      </dgm:t>
-    </dgm:pt>
-    <dgm:pt modelId="{8D7136ED-0C7F-460C-8E3B-D12195297427}">
-      <dgm:prSet/>
-      <dgm:spPr/>
-      <dgm:t>
-        <a:bodyPr/>
-        <a:lstStyle/>
-        <a:p>
-          <a:r>
-            <a:rPr lang="en-US"/>
-            <a:t>Dropdown Menu</a:t>
-          </a:r>
-        </a:p>
-      </dgm:t>
-    </dgm:pt>
-    <dgm:pt modelId="{F7800969-CC77-47D1-93EE-9BA638CDFF75}" type="parTrans" cxnId="{EC169CA1-A9F9-469A-9266-6B117B3436BF}">
-      <dgm:prSet/>
-      <dgm:spPr/>
-      <dgm:t>
-        <a:bodyPr/>
-        <a:lstStyle/>
-        <a:p>
-          <a:endParaRPr lang="en-US"/>
-        </a:p>
-      </dgm:t>
-    </dgm:pt>
-    <dgm:pt modelId="{906AE42E-A016-4B16-B74E-37017D4E5EB3}" type="sibTrans" cxnId="{EC169CA1-A9F9-469A-9266-6B117B3436BF}">
-      <dgm:prSet/>
-      <dgm:spPr/>
-      <dgm:t>
-        <a:bodyPr/>
-        <a:lstStyle/>
-        <a:p>
-          <a:endParaRPr lang="en-US"/>
-        </a:p>
-      </dgm:t>
-    </dgm:pt>
     <dgm:pt modelId="{595D2C21-2825-4C4B-BA89-B05EE71F976E}">
       <dgm:prSet/>
       <dgm:spPr/>
@@ -4037,6 +3979,9 @@
         <a:lstStyle/>
         <a:p>
           <a:pPr>
+            <a:lnSpc>
+              <a:spcPct val="100000"/>
+            </a:lnSpc>
             <a:defRPr b="1"/>
           </a:pPr>
           <a:r>
@@ -4076,6 +4021,9 @@
         <a:lstStyle/>
         <a:p>
           <a:pPr>
+            <a:lnSpc>
+              <a:spcPct val="100000"/>
+            </a:lnSpc>
             <a:defRPr b="1"/>
           </a:pPr>
           <a:r>
@@ -4351,16 +4299,12 @@
   </dgm:ptLst>
   <dgm:cxnLst>
     <dgm:cxn modelId="{9B20D112-61E2-40AD-A7F9-8383EA549244}" type="presOf" srcId="{FC1D1D94-2571-4D54-9FC8-9F7CA3CC7EF1}" destId="{BF9339DC-7F44-41BC-9D34-342A0511810C}" srcOrd="0" destOrd="0" presId="urn:microsoft.com/office/officeart/2018/5/layout/CenteredIconLabelDescriptionList"/>
-    <dgm:cxn modelId="{C12A122C-58CF-42CF-9AB5-3BA410ADEE77}" srcId="{BBDE2F33-EE3B-44DD-B8E0-89DB1C91B786}" destId="{B97FE348-2AB6-4978-852D-2F0D08C8CB18}" srcOrd="0" destOrd="0" parTransId="{CB4143C1-7673-4E4A-9CAF-4288107FA632}" sibTransId="{7E25D265-194D-4517-9852-59851AC39E82}"/>
     <dgm:cxn modelId="{DBF59A42-0D23-4B6D-B8CF-A6D9A04EA413}" type="presOf" srcId="{D7ED42B1-9CB1-4112-B698-B3F9EC17C043}" destId="{DCA51DE5-CDD5-45E5-B725-3F8E27370FDD}" srcOrd="0" destOrd="0" presId="urn:microsoft.com/office/officeart/2018/5/layout/CenteredIconLabelDescriptionList"/>
     <dgm:cxn modelId="{01FCC343-0CF3-4CBA-8AB4-FCDAE9A704AE}" type="presOf" srcId="{595D2C21-2825-4C4B-BA89-B05EE71F976E}" destId="{E8620448-FFCC-4D44-966C-B61B716C9B79}" srcOrd="0" destOrd="0" presId="urn:microsoft.com/office/officeart/2018/5/layout/CenteredIconLabelDescriptionList"/>
-    <dgm:cxn modelId="{2612EE68-4EBE-420D-B774-41D04D41CD13}" type="presOf" srcId="{8D7136ED-0C7F-460C-8E3B-D12195297427}" destId="{82E018F6-399A-449C-B5FA-399AF53735E0}" srcOrd="0" destOrd="1" presId="urn:microsoft.com/office/officeart/2018/5/layout/CenteredIconLabelDescriptionList"/>
     <dgm:cxn modelId="{A5C7B178-92AC-43CD-9D2D-D35415384F40}" srcId="{FC1D1D94-2571-4D54-9FC8-9F7CA3CC7EF1}" destId="{BBDE2F33-EE3B-44DD-B8E0-89DB1C91B786}" srcOrd="1" destOrd="0" parTransId="{D206F0B8-8A5F-424E-9BBB-7B888A969BE5}" sibTransId="{14E4516E-DF60-4CD4-A2A0-5CD7A8BEDF8C}"/>
     <dgm:cxn modelId="{66F27789-C835-48C5-B483-6AD04EBEA289}" type="presOf" srcId="{3C8137D2-33E9-4278-98E3-79D2A430EFDC}" destId="{ACFD80A8-804E-4192-948B-DFB19232EF1E}" srcOrd="0" destOrd="0" presId="urn:microsoft.com/office/officeart/2018/5/layout/CenteredIconLabelDescriptionList"/>
-    <dgm:cxn modelId="{EC169CA1-A9F9-469A-9266-6B117B3436BF}" srcId="{BBDE2F33-EE3B-44DD-B8E0-89DB1C91B786}" destId="{8D7136ED-0C7F-460C-8E3B-D12195297427}" srcOrd="1" destOrd="0" parTransId="{F7800969-CC77-47D1-93EE-9BA638CDFF75}" sibTransId="{906AE42E-A016-4B16-B74E-37017D4E5EB3}"/>
     <dgm:cxn modelId="{E3B9E1B4-79BB-4FA2-A853-72A38D8DC16C}" srcId="{FC1D1D94-2571-4D54-9FC8-9F7CA3CC7EF1}" destId="{3C8137D2-33E9-4278-98E3-79D2A430EFDC}" srcOrd="3" destOrd="0" parTransId="{27987015-6758-40A8-A65B-4DC0C7D04233}" sibTransId="{43B3BFE3-9629-45D4-AE01-56E6A1F6BF51}"/>
     <dgm:cxn modelId="{5CC48AE4-4779-4343-99A9-9B4AAEF0CBB8}" type="presOf" srcId="{BBDE2F33-EE3B-44DD-B8E0-89DB1C91B786}" destId="{4CD7BA3D-5535-4EF9-A866-3E1A110A4677}" srcOrd="0" destOrd="0" presId="urn:microsoft.com/office/officeart/2018/5/layout/CenteredIconLabelDescriptionList"/>
-    <dgm:cxn modelId="{5607C2EA-056D-42D7-82A7-64BC8F47D6C8}" type="presOf" srcId="{B97FE348-2AB6-4978-852D-2F0D08C8CB18}" destId="{82E018F6-399A-449C-B5FA-399AF53735E0}" srcOrd="0" destOrd="0" presId="urn:microsoft.com/office/officeart/2018/5/layout/CenteredIconLabelDescriptionList"/>
     <dgm:cxn modelId="{A62D1AEC-E3CA-4A93-9367-0A43B5ADBF41}" srcId="{FC1D1D94-2571-4D54-9FC8-9F7CA3CC7EF1}" destId="{D7ED42B1-9CB1-4112-B698-B3F9EC17C043}" srcOrd="0" destOrd="0" parTransId="{C8D59E26-B024-41A6-A4DB-9708C2D68D6C}" sibTransId="{D078B5D9-25F7-4EF9-8A7F-603D62397684}"/>
     <dgm:cxn modelId="{D0A1AAF5-A896-416E-8E84-92352C69E9FA}" srcId="{FC1D1D94-2571-4D54-9FC8-9F7CA3CC7EF1}" destId="{595D2C21-2825-4C4B-BA89-B05EE71F976E}" srcOrd="2" destOrd="0" parTransId="{D0E7318C-2CFE-43CD-BE28-3F9AD56FEB88}" sibTransId="{BA47D13F-C664-49FE-ADE9-16D5274A3814}"/>
     <dgm:cxn modelId="{B9BCE858-5B6A-4819-BED9-D17B0BE76506}" type="presParOf" srcId="{BF9339DC-7F44-41BC-9D34-342A0511810C}" destId="{5A71B56C-77A2-4ED6-84E7-0D7BD89D9207}" srcOrd="0" destOrd="0" presId="urn:microsoft.com/office/officeart/2018/5/layout/CenteredIconLabelDescriptionList"/>
@@ -4800,7 +4744,7 @@
           </a:pPr>
           <a:r>
             <a:rPr lang="en-US" dirty="0"/>
-            <a:t>Unit Testing</a:t>
+            <a:t>Server</a:t>
           </a:r>
         </a:p>
         <a:p>
@@ -4809,7 +4753,21 @@
           </a:pPr>
           <a:r>
             <a:rPr lang="en-US" dirty="0"/>
-            <a:t>MVC Paradigm</a:t>
+            <a:t>MySQL/</a:t>
+          </a:r>
+          <a:r>
+            <a:rPr lang="en-US" dirty="0" err="1"/>
+            <a:t>Sequelize</a:t>
+          </a:r>
+          <a:endParaRPr lang="en-US" dirty="0"/>
+        </a:p>
+        <a:p>
+          <a:pPr>
+            <a:defRPr b="1"/>
+          </a:pPr>
+          <a:r>
+            <a:rPr lang="en-US" dirty="0"/>
+            <a:t>Routes</a:t>
           </a:r>
         </a:p>
         <a:p>
@@ -4818,7 +4776,7 @@
           </a:pPr>
           <a:r>
             <a:rPr lang="en-US" dirty="0"/>
-            <a:t>MySQL </a:t>
+            <a:t>Database (Queries) </a:t>
           </a:r>
         </a:p>
       </dgm:t>
@@ -5965,7 +5923,7 @@
       </dsp:nvSpPr>
       <dsp:spPr>
         <a:xfrm>
-          <a:off x="764896" y="704052"/>
+          <a:off x="764896" y="831179"/>
           <a:ext cx="815062" cy="815062"/>
         </a:xfrm>
         <a:prstGeom prst="rect">
@@ -6013,8 +5971,8 @@
       </dsp:nvSpPr>
       <dsp:spPr>
         <a:xfrm>
-          <a:off x="8053" y="1600931"/>
-          <a:ext cx="2328750" cy="589464"/>
+          <a:off x="8053" y="1717125"/>
+          <a:ext cx="2328750" cy="654960"/>
         </a:xfrm>
         <a:prstGeom prst="rect">
           <a:avLst/>
@@ -6045,7 +6003,7 @@
         <a:p>
           <a:pPr marL="0" lvl="0" indent="0" algn="ctr" defTabSz="622300">
             <a:lnSpc>
-              <a:spcPct val="90000"/>
+              <a:spcPct val="100000"/>
             </a:lnSpc>
             <a:spcBef>
               <a:spcPct val="0"/>
@@ -6058,13 +6016,21 @@
           </a:pPr>
           <a:r>
             <a:rPr lang="en-US" sz="1400" kern="1200" dirty="0"/>
-            <a:t>The Traffic interface was created using Bootstrap and CSS</a:t>
+            <a:t>The </a:t>
+          </a:r>
+          <a:r>
+            <a:rPr lang="en-US" sz="1400" kern="1200" dirty="0" err="1"/>
+            <a:t>TrafficMon</a:t>
+          </a:r>
+          <a:r>
+            <a:rPr lang="en-US" sz="1400" kern="1200" dirty="0"/>
+            <a:t> interface was created using Bootstrap and CSS</a:t>
           </a:r>
         </a:p>
       </dsp:txBody>
       <dsp:txXfrm>
-        <a:off x="8053" y="1600931"/>
-        <a:ext cx="2328750" cy="589464"/>
+        <a:off x="8053" y="1717125"/>
+        <a:ext cx="2328750" cy="654960"/>
       </dsp:txXfrm>
     </dsp:sp>
     <dsp:sp modelId="{2FF5F4D3-FD62-4DD9-A486-45288463CEFB}">
@@ -6074,8 +6040,8 @@
       </dsp:nvSpPr>
       <dsp:spPr>
         <a:xfrm>
-          <a:off x="8053" y="2228450"/>
-          <a:ext cx="2328750" cy="378313"/>
+          <a:off x="8053" y="2405055"/>
+          <a:ext cx="2328750" cy="74580"/>
         </a:xfrm>
         <a:prstGeom prst="rect">
           <a:avLst/>
@@ -6106,7 +6072,7 @@
       </dsp:nvSpPr>
       <dsp:spPr>
         <a:xfrm>
-          <a:off x="3501178" y="704052"/>
+          <a:off x="3501178" y="831179"/>
           <a:ext cx="815062" cy="815062"/>
         </a:xfrm>
         <a:prstGeom prst="rect">
@@ -6154,8 +6120,8 @@
       </dsp:nvSpPr>
       <dsp:spPr>
         <a:xfrm>
-          <a:off x="2744334" y="1600931"/>
-          <a:ext cx="2328750" cy="589464"/>
+          <a:off x="2744334" y="1717125"/>
+          <a:ext cx="2328750" cy="654960"/>
         </a:xfrm>
         <a:prstGeom prst="rect">
           <a:avLst/>
@@ -6186,7 +6152,7 @@
         <a:p>
           <a:pPr marL="0" lvl="0" indent="0" algn="ctr" defTabSz="622300">
             <a:lnSpc>
-              <a:spcPct val="90000"/>
+              <a:spcPct val="100000"/>
             </a:lnSpc>
             <a:spcBef>
               <a:spcPct val="0"/>
@@ -6204,8 +6170,8 @@
         </a:p>
       </dsp:txBody>
       <dsp:txXfrm>
-        <a:off x="2744334" y="1600931"/>
-        <a:ext cx="2328750" cy="589464"/>
+        <a:off x="2744334" y="1717125"/>
+        <a:ext cx="2328750" cy="654960"/>
       </dsp:txXfrm>
     </dsp:sp>
     <dsp:sp modelId="{82E018F6-399A-449C-B5FA-399AF53735E0}">
@@ -6215,8 +6181,8 @@
       </dsp:nvSpPr>
       <dsp:spPr>
         <a:xfrm>
-          <a:off x="2744334" y="2228450"/>
-          <a:ext cx="2328750" cy="378313"/>
+          <a:off x="2744334" y="2405055"/>
+          <a:ext cx="2328750" cy="74580"/>
         </a:xfrm>
         <a:prstGeom prst="rect">
           <a:avLst/>
@@ -6239,52 +6205,6 @@
         </a:effectRef>
         <a:fontRef idx="minor"/>
       </dsp:style>
-      <dsp:txBody>
-        <a:bodyPr spcFirstLastPara="0" vert="horz" wrap="square" lIns="0" tIns="0" rIns="0" bIns="0" numCol="1" spcCol="1270" anchor="t" anchorCtr="0">
-          <a:noAutofit/>
-        </a:bodyPr>
-        <a:lstStyle/>
-        <a:p>
-          <a:pPr marL="0" lvl="0" indent="0" algn="ctr" defTabSz="488950">
-            <a:lnSpc>
-              <a:spcPct val="90000"/>
-            </a:lnSpc>
-            <a:spcBef>
-              <a:spcPct val="0"/>
-            </a:spcBef>
-            <a:spcAft>
-              <a:spcPct val="35000"/>
-            </a:spcAft>
-            <a:buNone/>
-          </a:pPr>
-          <a:r>
-            <a:rPr lang="en-US" sz="1100" kern="1200" dirty="0"/>
-            <a:t>Forms</a:t>
-          </a:r>
-        </a:p>
-        <a:p>
-          <a:pPr marL="0" lvl="0" indent="0" algn="ctr" defTabSz="488950">
-            <a:lnSpc>
-              <a:spcPct val="90000"/>
-            </a:lnSpc>
-            <a:spcBef>
-              <a:spcPct val="0"/>
-            </a:spcBef>
-            <a:spcAft>
-              <a:spcPct val="35000"/>
-            </a:spcAft>
-            <a:buNone/>
-          </a:pPr>
-          <a:r>
-            <a:rPr lang="en-US" sz="1100" kern="1200"/>
-            <a:t>Dropdown Menu</a:t>
-          </a:r>
-        </a:p>
-      </dsp:txBody>
-      <dsp:txXfrm>
-        <a:off x="2744334" y="2228450"/>
-        <a:ext cx="2328750" cy="378313"/>
-      </dsp:txXfrm>
     </dsp:sp>
     <dsp:sp modelId="{A3F55FC8-30A3-470A-9D86-037E0B425C19}">
       <dsp:nvSpPr>
@@ -6293,7 +6213,7 @@
       </dsp:nvSpPr>
       <dsp:spPr>
         <a:xfrm>
-          <a:off x="6237459" y="704052"/>
+          <a:off x="6237459" y="831179"/>
           <a:ext cx="815062" cy="815062"/>
         </a:xfrm>
         <a:prstGeom prst="rect">
@@ -6341,8 +6261,8 @@
       </dsp:nvSpPr>
       <dsp:spPr>
         <a:xfrm>
-          <a:off x="5480615" y="1600931"/>
-          <a:ext cx="2328750" cy="589464"/>
+          <a:off x="5480615" y="1717125"/>
+          <a:ext cx="2328750" cy="654960"/>
         </a:xfrm>
         <a:prstGeom prst="rect">
           <a:avLst/>
@@ -6373,7 +6293,7 @@
         <a:p>
           <a:pPr marL="0" lvl="0" indent="0" algn="ctr" defTabSz="622300">
             <a:lnSpc>
-              <a:spcPct val="90000"/>
+              <a:spcPct val="100000"/>
             </a:lnSpc>
             <a:spcBef>
               <a:spcPct val="0"/>
@@ -6391,8 +6311,8 @@
         </a:p>
       </dsp:txBody>
       <dsp:txXfrm>
-        <a:off x="5480615" y="1600931"/>
-        <a:ext cx="2328750" cy="589464"/>
+        <a:off x="5480615" y="1717125"/>
+        <a:ext cx="2328750" cy="654960"/>
       </dsp:txXfrm>
     </dsp:sp>
     <dsp:sp modelId="{07906F48-A1AC-4351-8A44-7896478A41A8}">
@@ -6402,8 +6322,8 @@
       </dsp:nvSpPr>
       <dsp:spPr>
         <a:xfrm>
-          <a:off x="5480615" y="2228450"/>
-          <a:ext cx="2328750" cy="378313"/>
+          <a:off x="5480615" y="2405055"/>
+          <a:ext cx="2328750" cy="74580"/>
         </a:xfrm>
         <a:prstGeom prst="rect">
           <a:avLst/>
@@ -6434,7 +6354,7 @@
       </dsp:nvSpPr>
       <dsp:spPr>
         <a:xfrm>
-          <a:off x="8973740" y="704052"/>
+          <a:off x="8973740" y="831179"/>
           <a:ext cx="815062" cy="815062"/>
         </a:xfrm>
         <a:prstGeom prst="rect">
@@ -6482,8 +6402,8 @@
       </dsp:nvSpPr>
       <dsp:spPr>
         <a:xfrm>
-          <a:off x="8216896" y="1600931"/>
-          <a:ext cx="2328750" cy="589464"/>
+          <a:off x="8216896" y="1717125"/>
+          <a:ext cx="2328750" cy="654960"/>
         </a:xfrm>
         <a:prstGeom prst="rect">
           <a:avLst/>
@@ -6514,7 +6434,7 @@
         <a:p>
           <a:pPr marL="0" lvl="0" indent="0" algn="ctr" defTabSz="622300">
             <a:lnSpc>
-              <a:spcPct val="90000"/>
+              <a:spcPct val="100000"/>
             </a:lnSpc>
             <a:spcBef>
               <a:spcPct val="0"/>
@@ -6532,8 +6452,8 @@
         </a:p>
       </dsp:txBody>
       <dsp:txXfrm>
-        <a:off x="8216896" y="1600931"/>
-        <a:ext cx="2328750" cy="589464"/>
+        <a:off x="8216896" y="1717125"/>
+        <a:ext cx="2328750" cy="654960"/>
       </dsp:txXfrm>
     </dsp:sp>
     <dsp:sp modelId="{7B732FC0-AC47-4ADB-987E-1D652758D80E}">
@@ -6543,8 +6463,8 @@
       </dsp:nvSpPr>
       <dsp:spPr>
         <a:xfrm>
-          <a:off x="8216896" y="2228450"/>
-          <a:ext cx="2328750" cy="378313"/>
+          <a:off x="8216896" y="2405055"/>
+          <a:ext cx="2328750" cy="74580"/>
         </a:xfrm>
         <a:prstGeom prst="rect">
           <a:avLst/>
@@ -7079,7 +6999,7 @@
         </a:bodyPr>
         <a:lstStyle/>
         <a:p>
-          <a:pPr marL="0" lvl="0" indent="0" algn="l" defTabSz="1155700">
+          <a:pPr marL="0" lvl="0" indent="0" algn="l" defTabSz="977900">
             <a:lnSpc>
               <a:spcPct val="90000"/>
             </a:lnSpc>
@@ -7093,12 +7013,12 @@
             <a:defRPr b="1"/>
           </a:pPr>
           <a:r>
-            <a:rPr lang="en-US" sz="2600" kern="1200" dirty="0"/>
-            <a:t>Unit Testing</a:t>
+            <a:rPr lang="en-US" sz="2200" kern="1200" dirty="0"/>
+            <a:t>Server</a:t>
           </a:r>
         </a:p>
         <a:p>
-          <a:pPr marL="0" lvl="0" indent="0" algn="l" defTabSz="1155700">
+          <a:pPr marL="0" lvl="0" indent="0" algn="l" defTabSz="977900">
             <a:lnSpc>
               <a:spcPct val="90000"/>
             </a:lnSpc>
@@ -7112,12 +7032,17 @@
             <a:defRPr b="1"/>
           </a:pPr>
           <a:r>
-            <a:rPr lang="en-US" sz="2600" kern="1200" dirty="0"/>
-            <a:t>MVC Paradigm</a:t>
+            <a:rPr lang="en-US" sz="2200" kern="1200" dirty="0"/>
+            <a:t>MySQL/</a:t>
           </a:r>
+          <a:r>
+            <a:rPr lang="en-US" sz="2200" kern="1200" dirty="0" err="1"/>
+            <a:t>Sequelize</a:t>
+          </a:r>
+          <a:endParaRPr lang="en-US" sz="2200" kern="1200" dirty="0"/>
         </a:p>
         <a:p>
-          <a:pPr marL="0" lvl="0" indent="0" algn="l" defTabSz="1155700">
+          <a:pPr marL="0" lvl="0" indent="0" algn="l" defTabSz="977900">
             <a:lnSpc>
               <a:spcPct val="90000"/>
             </a:lnSpc>
@@ -7131,8 +7056,27 @@
             <a:defRPr b="1"/>
           </a:pPr>
           <a:r>
-            <a:rPr lang="en-US" sz="2600" kern="1200" dirty="0"/>
-            <a:t>MySQL </a:t>
+            <a:rPr lang="en-US" sz="2200" kern="1200" dirty="0"/>
+            <a:t>Routes</a:t>
+          </a:r>
+        </a:p>
+        <a:p>
+          <a:pPr marL="0" lvl="0" indent="0" algn="l" defTabSz="977900">
+            <a:lnSpc>
+              <a:spcPct val="90000"/>
+            </a:lnSpc>
+            <a:spcBef>
+              <a:spcPct val="0"/>
+            </a:spcBef>
+            <a:spcAft>
+              <a:spcPct val="35000"/>
+            </a:spcAft>
+            <a:buNone/>
+            <a:defRPr b="1"/>
+          </a:pPr>
+          <a:r>
+            <a:rPr lang="en-US" sz="2200" kern="1200" dirty="0"/>
+            <a:t>Database (Queries) </a:t>
           </a:r>
         </a:p>
       </dsp:txBody>
@@ -7259,7 +7203,7 @@
         </a:bodyPr>
         <a:lstStyle/>
         <a:p>
-          <a:pPr marL="0" lvl="0" indent="0" algn="l" defTabSz="1155700">
+          <a:pPr marL="0" lvl="0" indent="0" algn="l" defTabSz="977900">
             <a:lnSpc>
               <a:spcPct val="90000"/>
             </a:lnSpc>
@@ -7273,12 +7217,12 @@
             <a:defRPr b="1"/>
           </a:pPr>
           <a:r>
-            <a:rPr lang="en-US" sz="2600" kern="1200" dirty="0"/>
+            <a:rPr lang="en-US" sz="2200" kern="1200" dirty="0"/>
             <a:t>Heroku Deploy</a:t>
           </a:r>
         </a:p>
         <a:p>
-          <a:pPr marL="0" lvl="0" indent="0" algn="l" defTabSz="1155700">
+          <a:pPr marL="0" lvl="0" indent="0" algn="l" defTabSz="977900">
             <a:lnSpc>
               <a:spcPct val="90000"/>
             </a:lnSpc>
@@ -7292,10 +7236,10 @@
             <a:defRPr b="1"/>
           </a:pPr>
           <a:r>
-            <a:rPr lang="en-US" sz="2600" kern="1200" dirty="0" err="1"/>
+            <a:rPr lang="en-US" sz="2200" kern="1200" dirty="0" err="1"/>
             <a:t>JawsDB</a:t>
           </a:r>
-          <a:endParaRPr lang="en-US" sz="2600" kern="1200" dirty="0"/>
+          <a:endParaRPr lang="en-US" sz="2200" kern="1200" dirty="0"/>
         </a:p>
       </dsp:txBody>
       <dsp:txXfrm>
@@ -13247,7 +13191,7 @@
           <a:effectLst/>
           <a:extLst>
             <a:ext uri="{91240B29-F687-4f45-9708-019B960494DF}">
-              <a14:hiddenLine xmlns="" xmlns:a14="http://schemas.microsoft.com/office/drawing/2010/main" w="9525">
+              <a14:hiddenLine xmlns:a14="http://schemas.microsoft.com/office/drawing/2010/main" xmlns="" w="9525">
                 <a:solidFill>
                   <a:srgbClr val="000000"/>
                 </a:solidFill>
@@ -14775,7 +14719,7 @@
           <a:ln/>
           <a:extLst>
             <a:ext uri="{91240B29-F687-4f45-9708-019B960494DF}">
-              <a14:hiddenLine xmlns="" xmlns:a14="http://schemas.microsoft.com/office/drawing/2010/main" w="9525">
+              <a14:hiddenLine xmlns:a14="http://schemas.microsoft.com/office/drawing/2010/main" xmlns="" w="9525">
                 <a:solidFill>
                   <a:srgbClr val="000000"/>
                 </a:solidFill>
@@ -15050,7 +14994,7 @@
           <a:ln/>
           <a:extLst>
             <a:ext uri="{91240B29-F687-4f45-9708-019B960494DF}">
-              <a14:hiddenLine xmlns="" xmlns:a14="http://schemas.microsoft.com/office/drawing/2010/main" w="9525">
+              <a14:hiddenLine xmlns:a14="http://schemas.microsoft.com/office/drawing/2010/main" xmlns="" w="9525">
                 <a:solidFill>
                   <a:srgbClr val="000000"/>
                 </a:solidFill>
@@ -15333,7 +15277,7 @@
           <a:ln/>
           <a:extLst>
             <a:ext uri="{91240B29-F687-4f45-9708-019B960494DF}">
-              <a14:hiddenLine xmlns="" xmlns:a14="http://schemas.microsoft.com/office/drawing/2010/main" w="9525">
+              <a14:hiddenLine xmlns:a14="http://schemas.microsoft.com/office/drawing/2010/main" xmlns="" w="9525">
                 <a:solidFill>
                   <a:srgbClr val="000000"/>
                 </a:solidFill>
@@ -15959,7 +15903,7 @@
           <a:ln/>
           <a:extLst>
             <a:ext uri="{91240B29-F687-4f45-9708-019B960494DF}">
-              <a14:hiddenLine xmlns="" xmlns:a14="http://schemas.microsoft.com/office/drawing/2010/main" w="9525">
+              <a14:hiddenLine xmlns:a14="http://schemas.microsoft.com/office/drawing/2010/main" xmlns="" w="9525">
                 <a:solidFill>
                   <a:srgbClr val="000000"/>
                 </a:solidFill>
@@ -16298,7 +16242,7 @@
           <a:ln/>
           <a:extLst>
             <a:ext uri="{91240B29-F687-4f45-9708-019B960494DF}">
-              <a14:hiddenLine xmlns="" xmlns:a14="http://schemas.microsoft.com/office/drawing/2010/main" w="9525">
+              <a14:hiddenLine xmlns:a14="http://schemas.microsoft.com/office/drawing/2010/main" xmlns="" w="9525">
                 <a:solidFill>
                   <a:srgbClr val="000000"/>
                 </a:solidFill>
@@ -16775,7 +16719,7 @@
           <a:ln/>
           <a:extLst>
             <a:ext uri="{91240B29-F687-4f45-9708-019B960494DF}">
-              <a14:hiddenLine xmlns="" xmlns:a14="http://schemas.microsoft.com/office/drawing/2010/main" w="9525">
+              <a14:hiddenLine xmlns:a14="http://schemas.microsoft.com/office/drawing/2010/main" xmlns="" w="9525">
                 <a:solidFill>
                   <a:srgbClr val="000000"/>
                 </a:solidFill>
@@ -17204,7 +17148,7 @@
           <a:ln/>
           <a:extLst>
             <a:ext uri="{91240B29-F687-4f45-9708-019B960494DF}">
-              <a14:hiddenLine xmlns="" xmlns:a14="http://schemas.microsoft.com/office/drawing/2010/main" w="9525">
+              <a14:hiddenLine xmlns:a14="http://schemas.microsoft.com/office/drawing/2010/main" xmlns="" w="9525">
                 <a:solidFill>
                   <a:srgbClr val="000000"/>
                 </a:solidFill>
@@ -18439,6 +18383,38 @@
           <a:chExt cx="0" cy="0"/>
         </a:xfrm>
       </p:grpSpPr>
+      <p:pic>
+        <p:nvPicPr>
+          <p:cNvPr id="8" name="Picture 7">
+            <a:extLst>
+              <a:ext uri="{FF2B5EF4-FFF2-40B4-BE49-F238E27FC236}">
+                <a16:creationId xmlns:a16="http://schemas.microsoft.com/office/drawing/2014/main" id="{450F395C-B501-024B-A46F-04FF3099DDD6}"/>
+              </a:ext>
+            </a:extLst>
+          </p:cNvPr>
+          <p:cNvPicPr>
+            <a:picLocks noChangeAspect="1"/>
+          </p:cNvPicPr>
+          <p:nvPr/>
+        </p:nvPicPr>
+        <p:blipFill>
+          <a:blip r:embed="rId2">
+            <a:alphaModFix amt="35000"/>
+          </a:blip>
+          <a:stretch>
+            <a:fillRect/>
+          </a:stretch>
+        </p:blipFill>
+        <p:spPr>
+          <a:xfrm>
+            <a:off x="0" y="1901953"/>
+            <a:ext cx="12192000" cy="4956048"/>
+          </a:xfrm>
+          <a:prstGeom prst="rect">
+            <a:avLst/>
+          </a:prstGeom>
+        </p:spPr>
+      </p:pic>
       <p:sp>
         <p:nvSpPr>
           <p:cNvPr id="2" name="Title 1">
@@ -18501,7 +18477,7 @@
             </a:pPr>
             <a:r>
               <a:rPr lang="en-US" dirty="0"/>
-              <a:t>Created by P2-Team-3 (Seal Team 3)</a:t>
+              <a:t>Created by Seal Team 3</a:t>
             </a:r>
           </a:p>
           <a:p>
@@ -18550,38 +18526,6 @@
           </a:p>
         </p:txBody>
       </p:sp>
-      <p:pic>
-        <p:nvPicPr>
-          <p:cNvPr id="8" name="Picture 7">
-            <a:extLst>
-              <a:ext uri="{FF2B5EF4-FFF2-40B4-BE49-F238E27FC236}">
-                <a16:creationId xmlns:a16="http://schemas.microsoft.com/office/drawing/2014/main" id="{450F395C-B501-024B-A46F-04FF3099DDD6}"/>
-              </a:ext>
-            </a:extLst>
-          </p:cNvPr>
-          <p:cNvPicPr>
-            <a:picLocks noChangeAspect="1"/>
-          </p:cNvPicPr>
-          <p:nvPr/>
-        </p:nvPicPr>
-        <p:blipFill>
-          <a:blip r:embed="rId2">
-            <a:alphaModFix amt="35000"/>
-          </a:blip>
-          <a:stretch>
-            <a:fillRect/>
-          </a:stretch>
-        </p:blipFill>
-        <p:spPr>
-          <a:xfrm>
-            <a:off x="0" y="1901953"/>
-            <a:ext cx="12192000" cy="4956048"/>
-          </a:xfrm>
-          <a:prstGeom prst="rect">
-            <a:avLst/>
-          </a:prstGeom>
-        </p:spPr>
-      </p:pic>
     </p:spTree>
     <p:extLst>
       <p:ext uri="{BB962C8B-B14F-4D97-AF65-F5344CB8AC3E}">
@@ -18893,7 +18837,7 @@
           <a:effectLst/>
           <a:extLst>
             <a:ext uri="{91240B29-F687-4f45-9708-019B960494DF}">
-              <a14:hiddenLine xmlns:a16="http://schemas.microsoft.com/office/drawing/2014/main" xmlns:p14="http://schemas.microsoft.com/office/powerpoint/2010/main" xmlns:a14="http://schemas.microsoft.com/office/drawing/2010/main" xmlns="" w="9525">
+              <a14:hiddenLine xmlns="" xmlns:a14="http://schemas.microsoft.com/office/drawing/2010/main" xmlns:p14="http://schemas.microsoft.com/office/powerpoint/2010/main" xmlns:a16="http://schemas.microsoft.com/office/drawing/2014/main" w="9525">
                 <a:solidFill>
                   <a:srgbClr val="000000"/>
                 </a:solidFill>
@@ -18992,8 +18936,12 @@
           <a:lstStyle/>
           <a:p>
             <a:r>
+              <a:rPr lang="en-US" dirty="0" err="1"/>
+              <a:t>TrafficMon</a:t>
+            </a:r>
+            <a:r>
               <a:rPr lang="en-US" dirty="0"/>
-              <a:t>Traffic is a application that will provide users with..</a:t>
+              <a:t> is a application that will provide users with..</a:t>
             </a:r>
           </a:p>
           <a:p>
@@ -19002,8 +18950,12 @@
           <a:p>
             <a:pPr lvl="1"/>
             <a:r>
+              <a:rPr lang="en-US" dirty="0" err="1"/>
+              <a:t>TrafficMon</a:t>
+            </a:r>
+            <a:r>
               <a:rPr lang="en-US" dirty="0"/>
-              <a:t>Traffic reports based on..</a:t>
+              <a:t> reports based on..</a:t>
             </a:r>
           </a:p>
           <a:p>
@@ -19235,7 +19187,7 @@
             <p:ph idx="1"/>
             <p:extLst>
               <p:ext uri="{D42A27DB-BD31-4B8C-83A1-F6EECF244321}">
-                <p14:modId xmlns:p14="http://schemas.microsoft.com/office/powerpoint/2010/main" val="3597133880"/>
+                <p14:modId xmlns:p14="http://schemas.microsoft.com/office/powerpoint/2010/main" val="2954393723"/>
               </p:ext>
             </p:extLst>
           </p:nvPr>
@@ -19443,7 +19395,7 @@
             <p:ph idx="1"/>
             <p:extLst>
               <p:ext uri="{D42A27DB-BD31-4B8C-83A1-F6EECF244321}">
-                <p14:modId xmlns:p14="http://schemas.microsoft.com/office/powerpoint/2010/main" val="3721358025"/>
+                <p14:modId xmlns:p14="http://schemas.microsoft.com/office/powerpoint/2010/main" val="996377652"/>
               </p:ext>
             </p:extLst>
           </p:nvPr>
@@ -19545,13 +19497,8 @@
           <a:p>
             <a:r>
               <a:rPr lang="en-US" dirty="0"/>
-              <a:t>Table joins (Users table and </a:t>
+              <a:t>Table joins (Users table and Reports table)</a:t>
             </a:r>
-            <a:r>
-              <a:rPr lang="en-US"/>
-              <a:t>Reports table)</a:t>
-            </a:r>
-            <a:endParaRPr lang="en-US" dirty="0"/>
           </a:p>
           <a:p>
             <a:endParaRPr lang="en-US" dirty="0"/>
@@ -19670,7 +19617,12 @@
             <p:ph idx="1"/>
           </p:nvPr>
         </p:nvSpPr>
-        <p:spPr/>
+        <p:spPr>
+          <a:xfrm>
+            <a:off x="810000" y="2678613"/>
+            <a:ext cx="10554574" cy="3732199"/>
+          </a:xfrm>
+        </p:spPr>
         <p:txBody>
           <a:bodyPr>
             <a:normAutofit/>
@@ -19691,20 +19643,13 @@
           <a:p>
             <a:r>
               <a:rPr lang="en-US" dirty="0"/>
-              <a:t>Validation for city and state</a:t>
+              <a:t>Validation for city</a:t>
             </a:r>
           </a:p>
           <a:p>
             <a:r>
               <a:rPr lang="en-US" dirty="0"/>
-              <a:t>Auto-detect location</a:t>
-            </a:r>
-          </a:p>
-          <a:p>
-            <a:pPr lvl="1"/>
-            <a:r>
-              <a:rPr lang="en-US" dirty="0"/>
-              <a:t>Display current/local reports (by city)</a:t>
+              <a:t>Auto-detect location (Display current/local reports by city)</a:t>
             </a:r>
           </a:p>
           <a:p>
@@ -19712,6 +19657,33 @@
               <a:rPr lang="en-US" dirty="0"/>
               <a:t>Map display</a:t>
             </a:r>
+          </a:p>
+          <a:p>
+            <a:r>
+              <a:rPr lang="en-US" dirty="0"/>
+              <a:t>Social Network integration</a:t>
+            </a:r>
+          </a:p>
+          <a:p>
+            <a:r>
+              <a:rPr lang="en-US" dirty="0"/>
+              <a:t>Error handling</a:t>
+            </a:r>
+          </a:p>
+          <a:p>
+            <a:r>
+              <a:rPr lang="en-US" dirty="0"/>
+              <a:t>Interface Update</a:t>
+            </a:r>
+          </a:p>
+          <a:p>
+            <a:r>
+              <a:rPr lang="en-US" dirty="0"/>
+              <a:t>Password reset options</a:t>
+            </a:r>
+          </a:p>
+          <a:p>
+            <a:endParaRPr lang="en-US" dirty="0"/>
           </a:p>
           <a:p>
             <a:endParaRPr lang="en-US" dirty="0"/>

</xml_diff>